<commit_message>
Everything till git merge has been added
</commit_message>
<xml_diff>
--- a/GIT.pptx
+++ b/GIT.pptx
@@ -16,6 +16,16 @@
     <p:sldId id="264" r:id="rId10"/>
     <p:sldId id="265" r:id="rId11"/>
     <p:sldId id="266" r:id="rId12"/>
+    <p:sldId id="267" r:id="rId13"/>
+    <p:sldId id="268" r:id="rId14"/>
+    <p:sldId id="269" r:id="rId15"/>
+    <p:sldId id="270" r:id="rId16"/>
+    <p:sldId id="271" r:id="rId17"/>
+    <p:sldId id="272" r:id="rId18"/>
+    <p:sldId id="273" r:id="rId19"/>
+    <p:sldId id="274" r:id="rId20"/>
+    <p:sldId id="275" r:id="rId21"/>
+    <p:sldId id="276" r:id="rId22"/>
   </p:sldIdLst>
   <p:sldSz cx="12192000" cy="6858000"/>
   <p:notesSz cx="6858000" cy="9144000"/>
@@ -849,7 +859,7 @@
             <a:fld id="{B61BEF0D-F0BB-DE4B-95CE-6DB70DBA9567}" type="datetimeFigureOut">
               <a:rPr lang="en-US" dirty="0"/>
               <a:pPr/>
-              <a:t>12/9/2017</a:t>
+              <a:t>12/10/2017</a:t>
             </a:fld>
             <a:endParaRPr lang="en-US" dirty="0"/>
           </a:p>
@@ -1097,7 +1107,7 @@
             <a:fld id="{B61BEF0D-F0BB-DE4B-95CE-6DB70DBA9567}" type="datetimeFigureOut">
               <a:rPr lang="en-US" dirty="0"/>
               <a:pPr/>
-              <a:t>12/9/2017</a:t>
+              <a:t>12/10/2017</a:t>
             </a:fld>
             <a:endParaRPr lang="en-US" dirty="0"/>
           </a:p>
@@ -1408,7 +1418,7 @@
             <a:fld id="{B61BEF0D-F0BB-DE4B-95CE-6DB70DBA9567}" type="datetimeFigureOut">
               <a:rPr lang="en-US" dirty="0"/>
               <a:pPr/>
-              <a:t>12/9/2017</a:t>
+              <a:t>12/10/2017</a:t>
             </a:fld>
             <a:endParaRPr lang="en-US" dirty="0"/>
           </a:p>
@@ -1746,7 +1756,7 @@
             <a:fld id="{B61BEF0D-F0BB-DE4B-95CE-6DB70DBA9567}" type="datetimeFigureOut">
               <a:rPr lang="en-US" dirty="0"/>
               <a:pPr/>
-              <a:t>12/9/2017</a:t>
+              <a:t>12/10/2017</a:t>
             </a:fld>
             <a:endParaRPr lang="en-US" dirty="0"/>
           </a:p>
@@ -2057,7 +2067,7 @@
             <a:fld id="{B61BEF0D-F0BB-DE4B-95CE-6DB70DBA9567}" type="datetimeFigureOut">
               <a:rPr lang="en-US" dirty="0"/>
               <a:pPr/>
-              <a:t>12/9/2017</a:t>
+              <a:t>12/10/2017</a:t>
             </a:fld>
             <a:endParaRPr lang="en-US" dirty="0"/>
           </a:p>
@@ -2447,7 +2457,7 @@
             <a:fld id="{B61BEF0D-F0BB-DE4B-95CE-6DB70DBA9567}" type="datetimeFigureOut">
               <a:rPr lang="en-US" dirty="0"/>
               <a:pPr/>
-              <a:t>12/9/2017</a:t>
+              <a:t>12/10/2017</a:t>
             </a:fld>
             <a:endParaRPr lang="en-US" dirty="0"/>
           </a:p>
@@ -2613,7 +2623,7 @@
           <a:p>
             <a:fld id="{55C6B4A9-1611-4792-9094-5F34BCA07E0B}" type="datetimeFigureOut">
               <a:rPr lang="en-US" dirty="0"/>
-              <a:t>12/9/2017</a:t>
+              <a:t>12/10/2017</a:t>
             </a:fld>
             <a:endParaRPr lang="en-US" dirty="0"/>
           </a:p>
@@ -2789,7 +2799,7 @@
             <a:fld id="{B61BEF0D-F0BB-DE4B-95CE-6DB70DBA9567}" type="datetimeFigureOut">
               <a:rPr lang="en-US" dirty="0"/>
               <a:pPr/>
-              <a:t>12/9/2017</a:t>
+              <a:t>12/10/2017</a:t>
             </a:fld>
             <a:endParaRPr lang="en-US" dirty="0"/>
           </a:p>
@@ -2962,7 +2972,7 @@
             <a:fld id="{B61BEF0D-F0BB-DE4B-95CE-6DB70DBA9567}" type="datetimeFigureOut">
               <a:rPr lang="en-US" dirty="0"/>
               <a:pPr/>
-              <a:t>12/9/2017</a:t>
+              <a:t>12/10/2017</a:t>
             </a:fld>
             <a:endParaRPr lang="en-US" dirty="0"/>
           </a:p>
@@ -3206,7 +3216,7 @@
             <a:fld id="{B61BEF0D-F0BB-DE4B-95CE-6DB70DBA9567}" type="datetimeFigureOut">
               <a:rPr lang="en-US" dirty="0"/>
               <a:pPr/>
-              <a:t>12/9/2017</a:t>
+              <a:t>12/10/2017</a:t>
             </a:fld>
             <a:endParaRPr lang="en-US" dirty="0"/>
           </a:p>
@@ -3434,7 +3444,7 @@
           <a:p>
             <a:fld id="{EB712588-04B1-427B-82EE-E8DB90309F08}" type="datetimeFigureOut">
               <a:rPr lang="en-US" dirty="0"/>
-              <a:t>12/9/2017</a:t>
+              <a:t>12/10/2017</a:t>
             </a:fld>
             <a:endParaRPr lang="en-US" dirty="0"/>
           </a:p>
@@ -3804,7 +3814,7 @@
             <a:fld id="{B61BEF0D-F0BB-DE4B-95CE-6DB70DBA9567}" type="datetimeFigureOut">
               <a:rPr lang="en-US" dirty="0"/>
               <a:pPr/>
-              <a:t>12/9/2017</a:t>
+              <a:t>12/10/2017</a:t>
             </a:fld>
             <a:endParaRPr lang="en-US" dirty="0"/>
           </a:p>
@@ -3924,7 +3934,7 @@
             <a:fld id="{B61BEF0D-F0BB-DE4B-95CE-6DB70DBA9567}" type="datetimeFigureOut">
               <a:rPr lang="en-US" dirty="0"/>
               <a:pPr/>
-              <a:t>12/9/2017</a:t>
+              <a:t>12/10/2017</a:t>
             </a:fld>
             <a:endParaRPr lang="en-US" dirty="0"/>
           </a:p>
@@ -4016,7 +4026,7 @@
             <a:fld id="{B61BEF0D-F0BB-DE4B-95CE-6DB70DBA9567}" type="datetimeFigureOut">
               <a:rPr lang="en-US" dirty="0"/>
               <a:pPr/>
-              <a:t>12/9/2017</a:t>
+              <a:t>12/10/2017</a:t>
             </a:fld>
             <a:endParaRPr lang="en-US" dirty="0"/>
           </a:p>
@@ -4267,7 +4277,7 @@
           <a:p>
             <a:fld id="{42A54C80-263E-416B-A8E0-580EDEADCBDC}" type="datetimeFigureOut">
               <a:rPr lang="en-US" dirty="0"/>
-              <a:t>12/9/2017</a:t>
+              <a:t>12/10/2017</a:t>
             </a:fld>
             <a:endParaRPr lang="en-US" dirty="0"/>
           </a:p>
@@ -4526,7 +4536,7 @@
             <a:fld id="{B61BEF0D-F0BB-DE4B-95CE-6DB70DBA9567}" type="datetimeFigureOut">
               <a:rPr lang="en-US" dirty="0"/>
               <a:pPr/>
-              <a:t>12/9/2017</a:t>
+              <a:t>12/10/2017</a:t>
             </a:fld>
             <a:endParaRPr lang="en-US" dirty="0"/>
           </a:p>
@@ -5266,7 +5276,7 @@
             <a:fld id="{B61BEF0D-F0BB-DE4B-95CE-6DB70DBA9567}" type="datetimeFigureOut">
               <a:rPr lang="en-US" dirty="0"/>
               <a:pPr/>
-              <a:t>12/9/2017</a:t>
+              <a:t>12/10/2017</a:t>
             </a:fld>
             <a:endParaRPr lang="en-US" dirty="0"/>
           </a:p>
@@ -6096,6 +6106,1045 @@
 </p:sld>
 </file>
 
+<file path=ppt/slides/slide12.xml><?xml version="1.0" encoding="utf-8"?>
+<p:sld xmlns:a="http://schemas.openxmlformats.org/drawingml/2006/main" xmlns:r="http://schemas.openxmlformats.org/officeDocument/2006/relationships" xmlns:p="http://schemas.openxmlformats.org/presentationml/2006/main">
+  <p:cSld>
+    <p:spTree>
+      <p:nvGrpSpPr>
+        <p:cNvPr id="1" name=""/>
+        <p:cNvGrpSpPr/>
+        <p:nvPr/>
+      </p:nvGrpSpPr>
+      <p:grpSpPr>
+        <a:xfrm>
+          <a:off x="0" y="0"/>
+          <a:ext cx="0" cy="0"/>
+          <a:chOff x="0" y="0"/>
+          <a:chExt cx="0" cy="0"/>
+        </a:xfrm>
+      </p:grpSpPr>
+      <p:sp>
+        <p:nvSpPr>
+          <p:cNvPr id="2" name="Title 1">
+            <a:extLst>
+              <a:ext uri="{FF2B5EF4-FFF2-40B4-BE49-F238E27FC236}">
+                <a16:creationId xmlns:a16="http://schemas.microsoft.com/office/drawing/2014/main" id="{78E96814-7DA1-4774-9AA2-E645DA5A0E1F}"/>
+              </a:ext>
+            </a:extLst>
+          </p:cNvPr>
+          <p:cNvSpPr>
+            <a:spLocks noGrp="1"/>
+          </p:cNvSpPr>
+          <p:nvPr>
+            <p:ph type="title"/>
+          </p:nvPr>
+        </p:nvSpPr>
+        <p:spPr/>
+        <p:txBody>
+          <a:bodyPr/>
+          <a:lstStyle/>
+          <a:p>
+            <a:r>
+              <a:rPr lang="en-US" dirty="0"/>
+              <a:t>Git diff</a:t>
+            </a:r>
+          </a:p>
+        </p:txBody>
+      </p:sp>
+      <p:sp>
+        <p:nvSpPr>
+          <p:cNvPr id="3" name="Content Placeholder 2">
+            <a:extLst>
+              <a:ext uri="{FF2B5EF4-FFF2-40B4-BE49-F238E27FC236}">
+                <a16:creationId xmlns:a16="http://schemas.microsoft.com/office/drawing/2014/main" id="{AF00D8AD-33DA-4BFD-B269-4070C0F4AA1B}"/>
+              </a:ext>
+            </a:extLst>
+          </p:cNvPr>
+          <p:cNvSpPr>
+            <a:spLocks noGrp="1"/>
+          </p:cNvSpPr>
+          <p:nvPr>
+            <p:ph idx="1"/>
+          </p:nvPr>
+        </p:nvSpPr>
+        <p:spPr/>
+        <p:txBody>
+          <a:bodyPr/>
+          <a:lstStyle/>
+          <a:p>
+            <a:r>
+              <a:rPr lang="en-IN" dirty="0"/>
+              <a:t>Before </a:t>
+            </a:r>
+            <a:r>
+              <a:rPr lang="en-IN" dirty="0" err="1"/>
+              <a:t>commiting</a:t>
+            </a:r>
+            <a:r>
+              <a:rPr lang="en-IN" dirty="0"/>
+              <a:t> , it is good to know what changes we have to the files. To accomplish this, the 'git diff' command is used. </a:t>
+            </a:r>
+          </a:p>
+          <a:p>
+            <a:r>
+              <a:rPr lang="en-IN" dirty="0"/>
+              <a:t>When we use the git diff command , we can see the changes made from the version of the files present in the previous commit. </a:t>
+            </a:r>
+          </a:p>
+          <a:p>
+            <a:r>
+              <a:rPr lang="en-IN" dirty="0"/>
+              <a:t>'git diff' : It tells us the changes made in the files which are </a:t>
+            </a:r>
+            <a:r>
+              <a:rPr lang="en-IN" dirty="0" err="1"/>
+              <a:t>unstaged</a:t>
+            </a:r>
+            <a:r>
+              <a:rPr lang="en-IN" dirty="0"/>
+              <a:t>.</a:t>
+            </a:r>
+            <a:endParaRPr lang="en-US" dirty="0"/>
+          </a:p>
+          <a:p>
+            <a:r>
+              <a:rPr lang="en-IN" dirty="0"/>
+              <a:t>'git diff --staged': It tells us the changes made in the files which have been staged.</a:t>
+            </a:r>
+            <a:endParaRPr lang="en-US" dirty="0"/>
+          </a:p>
+          <a:p>
+            <a:r>
+              <a:rPr lang="en-IN" dirty="0"/>
+              <a:t>'git diff HEAD': It tells us the changes made in all the files when compared with the last commit.</a:t>
+            </a:r>
+            <a:endParaRPr lang="en-US" dirty="0"/>
+          </a:p>
+          <a:p>
+            <a:r>
+              <a:rPr lang="en-IN" dirty="0"/>
+              <a:t>The HEAD is a pointer that holds your position within all your different commits. By default HEAD points to your most recent commit.</a:t>
+            </a:r>
+            <a:endParaRPr lang="en-US" dirty="0"/>
+          </a:p>
+          <a:p>
+            <a:endParaRPr lang="en-US" dirty="0"/>
+          </a:p>
+        </p:txBody>
+      </p:sp>
+    </p:spTree>
+    <p:extLst>
+      <p:ext uri="{BB962C8B-B14F-4D97-AF65-F5344CB8AC3E}">
+        <p14:creationId xmlns:p14="http://schemas.microsoft.com/office/powerpoint/2010/main" val="2247172331"/>
+      </p:ext>
+    </p:extLst>
+  </p:cSld>
+  <p:clrMapOvr>
+    <a:masterClrMapping/>
+  </p:clrMapOvr>
+</p:sld>
+</file>
+
+<file path=ppt/slides/slide13.xml><?xml version="1.0" encoding="utf-8"?>
+<p:sld xmlns:a="http://schemas.openxmlformats.org/drawingml/2006/main" xmlns:r="http://schemas.openxmlformats.org/officeDocument/2006/relationships" xmlns:p="http://schemas.openxmlformats.org/presentationml/2006/main">
+  <p:cSld>
+    <p:spTree>
+      <p:nvGrpSpPr>
+        <p:cNvPr id="1" name=""/>
+        <p:cNvGrpSpPr/>
+        <p:nvPr/>
+      </p:nvGrpSpPr>
+      <p:grpSpPr>
+        <a:xfrm>
+          <a:off x="0" y="0"/>
+          <a:ext cx="0" cy="0"/>
+          <a:chOff x="0" y="0"/>
+          <a:chExt cx="0" cy="0"/>
+        </a:xfrm>
+      </p:grpSpPr>
+      <p:sp>
+        <p:nvSpPr>
+          <p:cNvPr id="2" name="Title 1">
+            <a:extLst>
+              <a:ext uri="{FF2B5EF4-FFF2-40B4-BE49-F238E27FC236}">
+                <a16:creationId xmlns:a16="http://schemas.microsoft.com/office/drawing/2014/main" id="{E429AADE-193F-4409-9FBE-AD7DE0ECB30B}"/>
+              </a:ext>
+            </a:extLst>
+          </p:cNvPr>
+          <p:cNvSpPr>
+            <a:spLocks noGrp="1"/>
+          </p:cNvSpPr>
+          <p:nvPr>
+            <p:ph type="title"/>
+          </p:nvPr>
+        </p:nvSpPr>
+        <p:spPr/>
+        <p:txBody>
+          <a:bodyPr/>
+          <a:lstStyle/>
+          <a:p>
+            <a:r>
+              <a:rPr lang="en-US" dirty="0"/>
+              <a:t>Git log</a:t>
+            </a:r>
+          </a:p>
+        </p:txBody>
+      </p:sp>
+      <p:sp>
+        <p:nvSpPr>
+          <p:cNvPr id="3" name="Content Placeholder 2">
+            <a:extLst>
+              <a:ext uri="{FF2B5EF4-FFF2-40B4-BE49-F238E27FC236}">
+                <a16:creationId xmlns:a16="http://schemas.microsoft.com/office/drawing/2014/main" id="{51F7DC3F-3517-446F-ACBC-AFC7F49C1388}"/>
+              </a:ext>
+            </a:extLst>
+          </p:cNvPr>
+          <p:cNvSpPr>
+            <a:spLocks noGrp="1"/>
+          </p:cNvSpPr>
+          <p:nvPr>
+            <p:ph idx="1"/>
+          </p:nvPr>
+        </p:nvSpPr>
+        <p:spPr/>
+        <p:txBody>
+          <a:bodyPr/>
+          <a:lstStyle/>
+          <a:p>
+            <a:r>
+              <a:rPr lang="en-IN" dirty="0"/>
+              <a:t>At any point if we want to see the history of your repository(list commits made), we use the git log command.</a:t>
+            </a:r>
+          </a:p>
+          <a:p>
+            <a:r>
+              <a:rPr lang="en-IN" dirty="0"/>
+              <a:t>When we use the command, we can see the author of the commit, the date on which the commit was made and the message that was saved along each commit.</a:t>
+            </a:r>
+          </a:p>
+          <a:p>
+            <a:r>
+              <a:rPr lang="en-IN" dirty="0"/>
+              <a:t>We can use 'git log --summary' to see more information about each commit.</a:t>
+            </a:r>
+            <a:endParaRPr lang="en-US" dirty="0"/>
+          </a:p>
+          <a:p>
+            <a:endParaRPr lang="en-US" dirty="0"/>
+          </a:p>
+        </p:txBody>
+      </p:sp>
+    </p:spTree>
+    <p:extLst>
+      <p:ext uri="{BB962C8B-B14F-4D97-AF65-F5344CB8AC3E}">
+        <p14:creationId xmlns:p14="http://schemas.microsoft.com/office/powerpoint/2010/main" val="1573051432"/>
+      </p:ext>
+    </p:extLst>
+  </p:cSld>
+  <p:clrMapOvr>
+    <a:masterClrMapping/>
+  </p:clrMapOvr>
+</p:sld>
+</file>
+
+<file path=ppt/slides/slide14.xml><?xml version="1.0" encoding="utf-8"?>
+<p:sld xmlns:a="http://schemas.openxmlformats.org/drawingml/2006/main" xmlns:r="http://schemas.openxmlformats.org/officeDocument/2006/relationships" xmlns:p="http://schemas.openxmlformats.org/presentationml/2006/main">
+  <p:cSld>
+    <p:spTree>
+      <p:nvGrpSpPr>
+        <p:cNvPr id="1" name=""/>
+        <p:cNvGrpSpPr/>
+        <p:nvPr/>
+      </p:nvGrpSpPr>
+      <p:grpSpPr>
+        <a:xfrm>
+          <a:off x="0" y="0"/>
+          <a:ext cx="0" cy="0"/>
+          <a:chOff x="0" y="0"/>
+          <a:chExt cx="0" cy="0"/>
+        </a:xfrm>
+      </p:grpSpPr>
+      <p:sp>
+        <p:nvSpPr>
+          <p:cNvPr id="2" name="Title 1">
+            <a:extLst>
+              <a:ext uri="{FF2B5EF4-FFF2-40B4-BE49-F238E27FC236}">
+                <a16:creationId xmlns:a16="http://schemas.microsoft.com/office/drawing/2014/main" id="{E4279FC4-9F58-4BF7-8FA9-60151BCA90C6}"/>
+              </a:ext>
+            </a:extLst>
+          </p:cNvPr>
+          <p:cNvSpPr>
+            <a:spLocks noGrp="1"/>
+          </p:cNvSpPr>
+          <p:nvPr>
+            <p:ph type="title"/>
+          </p:nvPr>
+        </p:nvSpPr>
+        <p:spPr/>
+        <p:txBody>
+          <a:bodyPr/>
+          <a:lstStyle/>
+          <a:p>
+            <a:r>
+              <a:rPr lang="en-US" dirty="0"/>
+              <a:t>Remote Repositories</a:t>
+            </a:r>
+          </a:p>
+        </p:txBody>
+      </p:sp>
+      <p:sp>
+        <p:nvSpPr>
+          <p:cNvPr id="3" name="Content Placeholder 2">
+            <a:extLst>
+              <a:ext uri="{FF2B5EF4-FFF2-40B4-BE49-F238E27FC236}">
+                <a16:creationId xmlns:a16="http://schemas.microsoft.com/office/drawing/2014/main" id="{F19253E3-9B23-414A-B3A5-F4B7E3A9FE91}"/>
+              </a:ext>
+            </a:extLst>
+          </p:cNvPr>
+          <p:cNvSpPr>
+            <a:spLocks noGrp="1"/>
+          </p:cNvSpPr>
+          <p:nvPr>
+            <p:ph idx="1"/>
+          </p:nvPr>
+        </p:nvSpPr>
+        <p:spPr/>
+        <p:txBody>
+          <a:bodyPr/>
+          <a:lstStyle/>
+          <a:p>
+            <a:r>
+              <a:rPr lang="en-IN" dirty="0"/>
+              <a:t>Remote repositories are versions of your project that are hosted on the </a:t>
+            </a:r>
+            <a:r>
+              <a:rPr lang="en-IN" dirty="0" err="1"/>
+              <a:t>Internert</a:t>
+            </a:r>
+            <a:r>
+              <a:rPr lang="en-IN" dirty="0"/>
+              <a:t> or network somewhere.</a:t>
+            </a:r>
+          </a:p>
+          <a:p>
+            <a:r>
+              <a:rPr lang="en-IN" dirty="0"/>
+              <a:t>Collaborating with others involves managing these remote repositories and pushing and pulling data to and from them when you need to share work. </a:t>
+            </a:r>
+          </a:p>
+          <a:p>
+            <a:r>
+              <a:rPr lang="en-IN" dirty="0"/>
+              <a:t>Managing remote repositories includes knowing how to add remote repositories, remove remotes that are no longer valid, manage various remote branches and define them as being tracked or not, and more.</a:t>
+            </a:r>
+            <a:endParaRPr lang="en-US" dirty="0"/>
+          </a:p>
+        </p:txBody>
+      </p:sp>
+    </p:spTree>
+    <p:extLst>
+      <p:ext uri="{BB962C8B-B14F-4D97-AF65-F5344CB8AC3E}">
+        <p14:creationId xmlns:p14="http://schemas.microsoft.com/office/powerpoint/2010/main" val="2270949453"/>
+      </p:ext>
+    </p:extLst>
+  </p:cSld>
+  <p:clrMapOvr>
+    <a:masterClrMapping/>
+  </p:clrMapOvr>
+</p:sld>
+</file>
+
+<file path=ppt/slides/slide15.xml><?xml version="1.0" encoding="utf-8"?>
+<p:sld xmlns:a="http://schemas.openxmlformats.org/drawingml/2006/main" xmlns:r="http://schemas.openxmlformats.org/officeDocument/2006/relationships" xmlns:p="http://schemas.openxmlformats.org/presentationml/2006/main">
+  <p:cSld>
+    <p:spTree>
+      <p:nvGrpSpPr>
+        <p:cNvPr id="1" name=""/>
+        <p:cNvGrpSpPr/>
+        <p:nvPr/>
+      </p:nvGrpSpPr>
+      <p:grpSpPr>
+        <a:xfrm>
+          <a:off x="0" y="0"/>
+          <a:ext cx="0" cy="0"/>
+          <a:chOff x="0" y="0"/>
+          <a:chExt cx="0" cy="0"/>
+        </a:xfrm>
+      </p:grpSpPr>
+      <p:sp>
+        <p:nvSpPr>
+          <p:cNvPr id="2" name="Title 1">
+            <a:extLst>
+              <a:ext uri="{FF2B5EF4-FFF2-40B4-BE49-F238E27FC236}">
+                <a16:creationId xmlns:a16="http://schemas.microsoft.com/office/drawing/2014/main" id="{09AE0377-04C7-43B8-95B5-86E21F38669B}"/>
+              </a:ext>
+            </a:extLst>
+          </p:cNvPr>
+          <p:cNvSpPr>
+            <a:spLocks noGrp="1"/>
+          </p:cNvSpPr>
+          <p:nvPr>
+            <p:ph type="title"/>
+          </p:nvPr>
+        </p:nvSpPr>
+        <p:spPr/>
+        <p:txBody>
+          <a:bodyPr/>
+          <a:lstStyle/>
+          <a:p>
+            <a:r>
+              <a:rPr lang="en-US" dirty="0"/>
+              <a:t>Git remote add</a:t>
+            </a:r>
+          </a:p>
+        </p:txBody>
+      </p:sp>
+      <p:sp>
+        <p:nvSpPr>
+          <p:cNvPr id="3" name="Content Placeholder 2">
+            <a:extLst>
+              <a:ext uri="{FF2B5EF4-FFF2-40B4-BE49-F238E27FC236}">
+                <a16:creationId xmlns:a16="http://schemas.microsoft.com/office/drawing/2014/main" id="{097A4C94-E6A3-4DC7-A991-AE7969452CCA}"/>
+              </a:ext>
+            </a:extLst>
+          </p:cNvPr>
+          <p:cNvSpPr>
+            <a:spLocks noGrp="1"/>
+          </p:cNvSpPr>
+          <p:nvPr>
+            <p:ph idx="1"/>
+          </p:nvPr>
+        </p:nvSpPr>
+        <p:spPr/>
+        <p:txBody>
+          <a:bodyPr/>
+          <a:lstStyle/>
+          <a:p>
+            <a:r>
+              <a:rPr lang="en-IN" dirty="0"/>
+              <a:t>Before we push into a remote repo , we must create a remote repo somewhere say on </a:t>
+            </a:r>
+            <a:r>
+              <a:rPr lang="en-IN" dirty="0" err="1"/>
+              <a:t>Github</a:t>
+            </a:r>
+            <a:r>
+              <a:rPr lang="en-IN" dirty="0"/>
+              <a:t>.</a:t>
+            </a:r>
+          </a:p>
+          <a:p>
+            <a:r>
+              <a:rPr lang="en-IN" dirty="0"/>
+              <a:t>Once we have created a remote repository, we now have to connect the remote repo with our local repo so that we can push to and pull from the remote repo. </a:t>
+            </a:r>
+          </a:p>
+          <a:p>
+            <a:r>
+              <a:rPr lang="en-IN" dirty="0"/>
+              <a:t>To do this, we use the git remote add </a:t>
+            </a:r>
+            <a:r>
+              <a:rPr lang="en-IN" dirty="0" err="1"/>
+              <a:t>command.This</a:t>
+            </a:r>
+            <a:r>
+              <a:rPr lang="en-IN" dirty="0"/>
+              <a:t> command is of the form 'git remote add &lt;</a:t>
+            </a:r>
+            <a:r>
+              <a:rPr lang="en-IN" dirty="0" err="1"/>
+              <a:t>remote_name</a:t>
+            </a:r>
+            <a:r>
+              <a:rPr lang="en-IN" dirty="0"/>
+              <a:t>&gt; &lt;</a:t>
+            </a:r>
+            <a:r>
+              <a:rPr lang="en-IN" dirty="0" err="1"/>
+              <a:t>url</a:t>
+            </a:r>
+            <a:r>
+              <a:rPr lang="en-IN" dirty="0"/>
+              <a:t>&gt;’.</a:t>
+            </a:r>
+          </a:p>
+          <a:p>
+            <a:r>
+              <a:rPr lang="en-IN" dirty="0"/>
+              <a:t>We can give any remote name, but it is typical to name your main remote as origin.</a:t>
+            </a:r>
+          </a:p>
+          <a:p>
+            <a:pPr marL="0" indent="0">
+              <a:buNone/>
+            </a:pPr>
+            <a:r>
+              <a:rPr lang="en-IN" dirty="0"/>
+              <a:t> </a:t>
+            </a:r>
+            <a:endParaRPr lang="en-US" dirty="0"/>
+          </a:p>
+        </p:txBody>
+      </p:sp>
+    </p:spTree>
+    <p:extLst>
+      <p:ext uri="{BB962C8B-B14F-4D97-AF65-F5344CB8AC3E}">
+        <p14:creationId xmlns:p14="http://schemas.microsoft.com/office/powerpoint/2010/main" val="1593399689"/>
+      </p:ext>
+    </p:extLst>
+  </p:cSld>
+  <p:clrMapOvr>
+    <a:masterClrMapping/>
+  </p:clrMapOvr>
+</p:sld>
+</file>
+
+<file path=ppt/slides/slide16.xml><?xml version="1.0" encoding="utf-8"?>
+<p:sld xmlns:a="http://schemas.openxmlformats.org/drawingml/2006/main" xmlns:r="http://schemas.openxmlformats.org/officeDocument/2006/relationships" xmlns:p="http://schemas.openxmlformats.org/presentationml/2006/main">
+  <p:cSld>
+    <p:spTree>
+      <p:nvGrpSpPr>
+        <p:cNvPr id="1" name=""/>
+        <p:cNvGrpSpPr/>
+        <p:nvPr/>
+      </p:nvGrpSpPr>
+      <p:grpSpPr>
+        <a:xfrm>
+          <a:off x="0" y="0"/>
+          <a:ext cx="0" cy="0"/>
+          <a:chOff x="0" y="0"/>
+          <a:chExt cx="0" cy="0"/>
+        </a:xfrm>
+      </p:grpSpPr>
+      <p:sp>
+        <p:nvSpPr>
+          <p:cNvPr id="2" name="Title 1">
+            <a:extLst>
+              <a:ext uri="{FF2B5EF4-FFF2-40B4-BE49-F238E27FC236}">
+                <a16:creationId xmlns:a16="http://schemas.microsoft.com/office/drawing/2014/main" id="{D8B362DD-8B51-4502-BF27-462E0EC15EDD}"/>
+              </a:ext>
+            </a:extLst>
+          </p:cNvPr>
+          <p:cNvSpPr>
+            <a:spLocks noGrp="1"/>
+          </p:cNvSpPr>
+          <p:nvPr>
+            <p:ph type="title"/>
+          </p:nvPr>
+        </p:nvSpPr>
+        <p:spPr/>
+        <p:txBody>
+          <a:bodyPr/>
+          <a:lstStyle/>
+          <a:p>
+            <a:r>
+              <a:rPr lang="en-US" dirty="0"/>
+              <a:t>Git push</a:t>
+            </a:r>
+          </a:p>
+        </p:txBody>
+      </p:sp>
+      <p:sp>
+        <p:nvSpPr>
+          <p:cNvPr id="3" name="Content Placeholder 2">
+            <a:extLst>
+              <a:ext uri="{FF2B5EF4-FFF2-40B4-BE49-F238E27FC236}">
+                <a16:creationId xmlns:a16="http://schemas.microsoft.com/office/drawing/2014/main" id="{3F4BE62F-0167-4B3C-BDE2-35CB206C7959}"/>
+              </a:ext>
+            </a:extLst>
+          </p:cNvPr>
+          <p:cNvSpPr>
+            <a:spLocks noGrp="1"/>
+          </p:cNvSpPr>
+          <p:nvPr>
+            <p:ph idx="1"/>
+          </p:nvPr>
+        </p:nvSpPr>
+        <p:spPr/>
+        <p:txBody>
+          <a:bodyPr/>
+          <a:lstStyle/>
+          <a:p>
+            <a:r>
+              <a:rPr lang="en-IN" dirty="0"/>
+              <a:t>The git push command is used to push the contents of your local repository into the remote repository present on </a:t>
+            </a:r>
+            <a:r>
+              <a:rPr lang="en-IN" dirty="0" err="1"/>
+              <a:t>Github</a:t>
+            </a:r>
+            <a:r>
+              <a:rPr lang="en-IN" dirty="0"/>
+              <a:t>.</a:t>
+            </a:r>
+          </a:p>
+          <a:p>
+            <a:r>
+              <a:rPr lang="en-IN" dirty="0"/>
+              <a:t>We need to specify which remote we are pushing into and also need to specify which branch in the remote repository.</a:t>
+            </a:r>
+          </a:p>
+          <a:p>
+            <a:r>
+              <a:rPr lang="en-IN" dirty="0"/>
+              <a:t>This command is of the form 'git push -u &lt;</a:t>
+            </a:r>
+            <a:r>
+              <a:rPr lang="en-IN" dirty="0" err="1"/>
+              <a:t>remote_name</a:t>
+            </a:r>
+            <a:r>
+              <a:rPr lang="en-IN" dirty="0"/>
+              <a:t>&gt; &lt;</a:t>
+            </a:r>
+            <a:r>
+              <a:rPr lang="en-IN" dirty="0" err="1"/>
+              <a:t>branch_name</a:t>
+            </a:r>
+            <a:r>
+              <a:rPr lang="en-IN" dirty="0"/>
+              <a:t>&gt;’. </a:t>
+            </a:r>
+          </a:p>
+          <a:p>
+            <a:r>
+              <a:rPr lang="en-IN" dirty="0"/>
+              <a:t>The -u option of the push command tells git to remember the </a:t>
+            </a:r>
+            <a:r>
+              <a:rPr lang="en-IN" dirty="0" err="1"/>
+              <a:t>paramters</a:t>
+            </a:r>
+            <a:r>
+              <a:rPr lang="en-IN" dirty="0"/>
+              <a:t>, so that next time we can simply run git push and git will know what to do.</a:t>
+            </a:r>
+            <a:endParaRPr lang="en-US" dirty="0"/>
+          </a:p>
+          <a:p>
+            <a:pPr marL="0" indent="0">
+              <a:buNone/>
+            </a:pPr>
+            <a:r>
+              <a:rPr lang="en-IN" dirty="0"/>
+              <a:t> </a:t>
+            </a:r>
+            <a:endParaRPr lang="en-US" dirty="0"/>
+          </a:p>
+        </p:txBody>
+      </p:sp>
+    </p:spTree>
+    <p:extLst>
+      <p:ext uri="{BB962C8B-B14F-4D97-AF65-F5344CB8AC3E}">
+        <p14:creationId xmlns:p14="http://schemas.microsoft.com/office/powerpoint/2010/main" val="2565694986"/>
+      </p:ext>
+    </p:extLst>
+  </p:cSld>
+  <p:clrMapOvr>
+    <a:masterClrMapping/>
+  </p:clrMapOvr>
+</p:sld>
+</file>
+
+<file path=ppt/slides/slide17.xml><?xml version="1.0" encoding="utf-8"?>
+<p:sld xmlns:a="http://schemas.openxmlformats.org/drawingml/2006/main" xmlns:r="http://schemas.openxmlformats.org/officeDocument/2006/relationships" xmlns:p="http://schemas.openxmlformats.org/presentationml/2006/main">
+  <p:cSld>
+    <p:spTree>
+      <p:nvGrpSpPr>
+        <p:cNvPr id="1" name=""/>
+        <p:cNvGrpSpPr/>
+        <p:nvPr/>
+      </p:nvGrpSpPr>
+      <p:grpSpPr>
+        <a:xfrm>
+          <a:off x="0" y="0"/>
+          <a:ext cx="0" cy="0"/>
+          <a:chOff x="0" y="0"/>
+          <a:chExt cx="0" cy="0"/>
+        </a:xfrm>
+      </p:grpSpPr>
+      <p:sp>
+        <p:nvSpPr>
+          <p:cNvPr id="2" name="Title 1">
+            <a:extLst>
+              <a:ext uri="{FF2B5EF4-FFF2-40B4-BE49-F238E27FC236}">
+                <a16:creationId xmlns:a16="http://schemas.microsoft.com/office/drawing/2014/main" id="{B5A736D5-443C-429F-9089-73338B860010}"/>
+              </a:ext>
+            </a:extLst>
+          </p:cNvPr>
+          <p:cNvSpPr>
+            <a:spLocks noGrp="1"/>
+          </p:cNvSpPr>
+          <p:nvPr>
+            <p:ph type="title"/>
+          </p:nvPr>
+        </p:nvSpPr>
+        <p:spPr/>
+        <p:txBody>
+          <a:bodyPr/>
+          <a:lstStyle/>
+          <a:p>
+            <a:r>
+              <a:rPr lang="en-US" dirty="0"/>
+              <a:t>Git pull</a:t>
+            </a:r>
+          </a:p>
+        </p:txBody>
+      </p:sp>
+      <p:sp>
+        <p:nvSpPr>
+          <p:cNvPr id="3" name="Content Placeholder 2">
+            <a:extLst>
+              <a:ext uri="{FF2B5EF4-FFF2-40B4-BE49-F238E27FC236}">
+                <a16:creationId xmlns:a16="http://schemas.microsoft.com/office/drawing/2014/main" id="{93306214-3298-4896-861E-7499BCEE95F5}"/>
+              </a:ext>
+            </a:extLst>
+          </p:cNvPr>
+          <p:cNvSpPr>
+            <a:spLocks noGrp="1"/>
+          </p:cNvSpPr>
+          <p:nvPr>
+            <p:ph idx="1"/>
+          </p:nvPr>
+        </p:nvSpPr>
+        <p:spPr/>
+        <p:txBody>
+          <a:bodyPr/>
+          <a:lstStyle/>
+          <a:p>
+            <a:r>
+              <a:rPr lang="en-IN" dirty="0"/>
+              <a:t>Suppose that you are working with many people on a project and you have a remote repo on </a:t>
+            </a:r>
+            <a:r>
+              <a:rPr lang="en-IN" dirty="0" err="1"/>
+              <a:t>Github</a:t>
+            </a:r>
+            <a:r>
+              <a:rPr lang="en-IN" dirty="0"/>
+              <a:t>. </a:t>
+            </a:r>
+          </a:p>
+          <a:p>
+            <a:r>
+              <a:rPr lang="en-IN" dirty="0"/>
+              <a:t>After a period of time , if we want to see the changes made by others we can use the git pull command to pull files from the remote repo to our local one. </a:t>
+            </a:r>
+          </a:p>
+          <a:p>
+            <a:r>
+              <a:rPr lang="en-IN" dirty="0"/>
+              <a:t>When we use git pull, it merges our current local repo with the files obtained from the remote repo. </a:t>
+            </a:r>
+          </a:p>
+          <a:p>
+            <a:r>
+              <a:rPr lang="en-IN" dirty="0"/>
+              <a:t>Just as in the case of git push, we need to specify the name of the remote and the branch from which we are pulling. </a:t>
+            </a:r>
+          </a:p>
+          <a:p>
+            <a:r>
+              <a:rPr lang="en-IN" dirty="0"/>
+              <a:t>The git pull command will be of the form 'git pull &lt;</a:t>
+            </a:r>
+            <a:r>
+              <a:rPr lang="en-IN" dirty="0" err="1"/>
+              <a:t>remote_name</a:t>
+            </a:r>
+            <a:r>
+              <a:rPr lang="en-IN" dirty="0"/>
+              <a:t>&gt; &lt;</a:t>
+            </a:r>
+            <a:r>
+              <a:rPr lang="en-IN" dirty="0" err="1"/>
+              <a:t>branch_name</a:t>
+            </a:r>
+            <a:r>
+              <a:rPr lang="en-IN" dirty="0"/>
+              <a:t>&gt;'.</a:t>
+            </a:r>
+            <a:endParaRPr lang="en-US" dirty="0"/>
+          </a:p>
+          <a:p>
+            <a:endParaRPr lang="en-US" dirty="0"/>
+          </a:p>
+        </p:txBody>
+      </p:sp>
+    </p:spTree>
+    <p:extLst>
+      <p:ext uri="{BB962C8B-B14F-4D97-AF65-F5344CB8AC3E}">
+        <p14:creationId xmlns:p14="http://schemas.microsoft.com/office/powerpoint/2010/main" val="1501208876"/>
+      </p:ext>
+    </p:extLst>
+  </p:cSld>
+  <p:clrMapOvr>
+    <a:masterClrMapping/>
+  </p:clrMapOvr>
+</p:sld>
+</file>
+
+<file path=ppt/slides/slide18.xml><?xml version="1.0" encoding="utf-8"?>
+<p:sld xmlns:a="http://schemas.openxmlformats.org/drawingml/2006/main" xmlns:r="http://schemas.openxmlformats.org/officeDocument/2006/relationships" xmlns:p="http://schemas.openxmlformats.org/presentationml/2006/main">
+  <p:cSld>
+    <p:spTree>
+      <p:nvGrpSpPr>
+        <p:cNvPr id="1" name=""/>
+        <p:cNvGrpSpPr/>
+        <p:nvPr/>
+      </p:nvGrpSpPr>
+      <p:grpSpPr>
+        <a:xfrm>
+          <a:off x="0" y="0"/>
+          <a:ext cx="0" cy="0"/>
+          <a:chOff x="0" y="0"/>
+          <a:chExt cx="0" cy="0"/>
+        </a:xfrm>
+      </p:grpSpPr>
+      <p:sp>
+        <p:nvSpPr>
+          <p:cNvPr id="2" name="Title 1">
+            <a:extLst>
+              <a:ext uri="{FF2B5EF4-FFF2-40B4-BE49-F238E27FC236}">
+                <a16:creationId xmlns:a16="http://schemas.microsoft.com/office/drawing/2014/main" id="{1AFDA0A1-9B3A-4266-A955-8E69B6152A40}"/>
+              </a:ext>
+            </a:extLst>
+          </p:cNvPr>
+          <p:cNvSpPr>
+            <a:spLocks noGrp="1"/>
+          </p:cNvSpPr>
+          <p:nvPr>
+            <p:ph type="title"/>
+          </p:nvPr>
+        </p:nvSpPr>
+        <p:spPr/>
+        <p:txBody>
+          <a:bodyPr/>
+          <a:lstStyle/>
+          <a:p>
+            <a:r>
+              <a:rPr lang="en-US" dirty="0"/>
+              <a:t>Git </a:t>
+            </a:r>
+            <a:r>
+              <a:rPr lang="en-US" dirty="0" err="1"/>
+              <a:t>rm</a:t>
+            </a:r>
+            <a:endParaRPr lang="en-US" dirty="0"/>
+          </a:p>
+        </p:txBody>
+      </p:sp>
+      <p:sp>
+        <p:nvSpPr>
+          <p:cNvPr id="3" name="Content Placeholder 2">
+            <a:extLst>
+              <a:ext uri="{FF2B5EF4-FFF2-40B4-BE49-F238E27FC236}">
+                <a16:creationId xmlns:a16="http://schemas.microsoft.com/office/drawing/2014/main" id="{0A567B04-044F-404E-871A-BB732B5640C8}"/>
+              </a:ext>
+            </a:extLst>
+          </p:cNvPr>
+          <p:cNvSpPr>
+            <a:spLocks noGrp="1"/>
+          </p:cNvSpPr>
+          <p:nvPr>
+            <p:ph idx="1"/>
+          </p:nvPr>
+        </p:nvSpPr>
+        <p:spPr/>
+        <p:txBody>
+          <a:bodyPr/>
+          <a:lstStyle/>
+          <a:p>
+            <a:r>
+              <a:rPr lang="en-IN" dirty="0"/>
+              <a:t>The git </a:t>
+            </a:r>
+            <a:r>
+              <a:rPr lang="en-IN" dirty="0" err="1"/>
+              <a:t>rm</a:t>
+            </a:r>
+            <a:r>
+              <a:rPr lang="en-IN" dirty="0"/>
+              <a:t> command is used to remove files from the repo. Along with removal from the repo, this command also stages the removal of the files.</a:t>
+            </a:r>
+          </a:p>
+          <a:p>
+            <a:r>
+              <a:rPr lang="en-IN" dirty="0"/>
+              <a:t>That is, when we use the git status command, we can see the deleted files in the staging area. </a:t>
+            </a:r>
+          </a:p>
+          <a:p>
+            <a:r>
+              <a:rPr lang="en-IN" dirty="0"/>
+              <a:t>Now if we commit, these files will be removed in the snapshot of the repository.</a:t>
+            </a:r>
+            <a:endParaRPr lang="en-US" dirty="0"/>
+          </a:p>
+          <a:p>
+            <a:r>
+              <a:rPr lang="en-IN" dirty="0"/>
+              <a:t>If we want to delete an entire folder of files, we use the command 'git </a:t>
+            </a:r>
+            <a:r>
+              <a:rPr lang="en-IN" dirty="0" err="1"/>
+              <a:t>rm</a:t>
+            </a:r>
+            <a:r>
+              <a:rPr lang="en-IN" dirty="0"/>
+              <a:t> -r &lt;</a:t>
+            </a:r>
+            <a:r>
+              <a:rPr lang="en-IN" dirty="0" err="1"/>
+              <a:t>folder_name</a:t>
+            </a:r>
+            <a:r>
+              <a:rPr lang="en-IN" dirty="0"/>
+              <a:t>&gt;'.</a:t>
+            </a:r>
+            <a:endParaRPr lang="en-US" dirty="0"/>
+          </a:p>
+          <a:p>
+            <a:endParaRPr lang="en-US" dirty="0"/>
+          </a:p>
+        </p:txBody>
+      </p:sp>
+    </p:spTree>
+    <p:extLst>
+      <p:ext uri="{BB962C8B-B14F-4D97-AF65-F5344CB8AC3E}">
+        <p14:creationId xmlns:p14="http://schemas.microsoft.com/office/powerpoint/2010/main" val="3610050590"/>
+      </p:ext>
+    </p:extLst>
+  </p:cSld>
+  <p:clrMapOvr>
+    <a:masterClrMapping/>
+  </p:clrMapOvr>
+</p:sld>
+</file>
+
+<file path=ppt/slides/slide19.xml><?xml version="1.0" encoding="utf-8"?>
+<p:sld xmlns:a="http://schemas.openxmlformats.org/drawingml/2006/main" xmlns:r="http://schemas.openxmlformats.org/officeDocument/2006/relationships" xmlns:p="http://schemas.openxmlformats.org/presentationml/2006/main">
+  <p:cSld>
+    <p:spTree>
+      <p:nvGrpSpPr>
+        <p:cNvPr id="1" name=""/>
+        <p:cNvGrpSpPr/>
+        <p:nvPr/>
+      </p:nvGrpSpPr>
+      <p:grpSpPr>
+        <a:xfrm>
+          <a:off x="0" y="0"/>
+          <a:ext cx="0" cy="0"/>
+          <a:chOff x="0" y="0"/>
+          <a:chExt cx="0" cy="0"/>
+        </a:xfrm>
+      </p:grpSpPr>
+      <p:sp>
+        <p:nvSpPr>
+          <p:cNvPr id="2" name="Title 1">
+            <a:extLst>
+              <a:ext uri="{FF2B5EF4-FFF2-40B4-BE49-F238E27FC236}">
+                <a16:creationId xmlns:a16="http://schemas.microsoft.com/office/drawing/2014/main" id="{381F42D2-EF87-4BA4-A344-BDA5A1539601}"/>
+              </a:ext>
+            </a:extLst>
+          </p:cNvPr>
+          <p:cNvSpPr>
+            <a:spLocks noGrp="1"/>
+          </p:cNvSpPr>
+          <p:nvPr>
+            <p:ph type="title"/>
+          </p:nvPr>
+        </p:nvSpPr>
+        <p:spPr/>
+        <p:txBody>
+          <a:bodyPr/>
+          <a:lstStyle/>
+          <a:p>
+            <a:r>
+              <a:rPr lang="en-US" dirty="0"/>
+              <a:t>Git branch</a:t>
+            </a:r>
+          </a:p>
+        </p:txBody>
+      </p:sp>
+      <p:sp>
+        <p:nvSpPr>
+          <p:cNvPr id="3" name="Content Placeholder 2">
+            <a:extLst>
+              <a:ext uri="{FF2B5EF4-FFF2-40B4-BE49-F238E27FC236}">
+                <a16:creationId xmlns:a16="http://schemas.microsoft.com/office/drawing/2014/main" id="{9826FE6E-259B-4918-80BB-65E8AB8D5D4E}"/>
+              </a:ext>
+            </a:extLst>
+          </p:cNvPr>
+          <p:cNvSpPr>
+            <a:spLocks noGrp="1"/>
+          </p:cNvSpPr>
+          <p:nvPr>
+            <p:ph idx="1"/>
+          </p:nvPr>
+        </p:nvSpPr>
+        <p:spPr/>
+        <p:txBody>
+          <a:bodyPr/>
+          <a:lstStyle/>
+          <a:p>
+            <a:r>
+              <a:rPr lang="en-IN" dirty="0"/>
+              <a:t>Branches are what naturally happens when you want to work on multiple features at the same time. </a:t>
+            </a:r>
+          </a:p>
+          <a:p>
+            <a:r>
+              <a:rPr lang="en-IN" dirty="0"/>
+              <a:t>In git when we create a branch , a copy of the repository in the current state is created. We can work on this branch and make changes to it without affecting the main branch. </a:t>
+            </a:r>
+          </a:p>
+          <a:p>
+            <a:r>
+              <a:rPr lang="en-IN" dirty="0"/>
+              <a:t>We use branches when we must work on multiple features at the same time.</a:t>
+            </a:r>
+          </a:p>
+          <a:p>
+            <a:r>
+              <a:rPr lang="en-IN" dirty="0"/>
+              <a:t>A separate branch can be created for each feature. Now, in git to create a branch we use the command 'git branch &lt;</a:t>
+            </a:r>
+            <a:r>
+              <a:rPr lang="en-IN" dirty="0" err="1"/>
+              <a:t>branch_name</a:t>
+            </a:r>
+            <a:r>
+              <a:rPr lang="en-IN" dirty="0"/>
+              <a:t>&gt;’. </a:t>
+            </a:r>
+          </a:p>
+          <a:p>
+            <a:r>
+              <a:rPr lang="en-IN" dirty="0"/>
+              <a:t>This creates a copy of the current state of the current branch we are on. Once we finish working on a branch, we can merge the branch with the main branch.</a:t>
+            </a:r>
+            <a:endParaRPr lang="en-US" dirty="0"/>
+          </a:p>
+          <a:p>
+            <a:endParaRPr lang="en-US" dirty="0"/>
+          </a:p>
+        </p:txBody>
+      </p:sp>
+    </p:spTree>
+    <p:extLst>
+      <p:ext uri="{BB962C8B-B14F-4D97-AF65-F5344CB8AC3E}">
+        <p14:creationId xmlns:p14="http://schemas.microsoft.com/office/powerpoint/2010/main" val="1522860056"/>
+      </p:ext>
+    </p:extLst>
+  </p:cSld>
+  <p:clrMapOvr>
+    <a:masterClrMapping/>
+  </p:clrMapOvr>
+</p:sld>
+</file>
+
 <file path=ppt/slides/slide2.xml><?xml version="1.0" encoding="utf-8"?>
 <p:sld xmlns:a="http://schemas.openxmlformats.org/drawingml/2006/main" xmlns:r="http://schemas.openxmlformats.org/officeDocument/2006/relationships" xmlns:p="http://schemas.openxmlformats.org/presentationml/2006/main">
   <p:cSld>
@@ -6186,6 +7235,231 @@
     <p:extLst>
       <p:ext uri="{BB962C8B-B14F-4D97-AF65-F5344CB8AC3E}">
         <p14:creationId xmlns:p14="http://schemas.microsoft.com/office/powerpoint/2010/main" val="351359086"/>
+      </p:ext>
+    </p:extLst>
+  </p:cSld>
+  <p:clrMapOvr>
+    <a:masterClrMapping/>
+  </p:clrMapOvr>
+</p:sld>
+</file>
+
+<file path=ppt/slides/slide20.xml><?xml version="1.0" encoding="utf-8"?>
+<p:sld xmlns:a="http://schemas.openxmlformats.org/drawingml/2006/main" xmlns:r="http://schemas.openxmlformats.org/officeDocument/2006/relationships" xmlns:p="http://schemas.openxmlformats.org/presentationml/2006/main">
+  <p:cSld>
+    <p:spTree>
+      <p:nvGrpSpPr>
+        <p:cNvPr id="1" name=""/>
+        <p:cNvGrpSpPr/>
+        <p:nvPr/>
+      </p:nvGrpSpPr>
+      <p:grpSpPr>
+        <a:xfrm>
+          <a:off x="0" y="0"/>
+          <a:ext cx="0" cy="0"/>
+          <a:chOff x="0" y="0"/>
+          <a:chExt cx="0" cy="0"/>
+        </a:xfrm>
+      </p:grpSpPr>
+      <p:sp>
+        <p:nvSpPr>
+          <p:cNvPr id="2" name="Title 1">
+            <a:extLst>
+              <a:ext uri="{FF2B5EF4-FFF2-40B4-BE49-F238E27FC236}">
+                <a16:creationId xmlns:a16="http://schemas.microsoft.com/office/drawing/2014/main" id="{FCFD7837-B396-47D4-9AE2-2DAC65CC2391}"/>
+              </a:ext>
+            </a:extLst>
+          </p:cNvPr>
+          <p:cNvSpPr>
+            <a:spLocks noGrp="1"/>
+          </p:cNvSpPr>
+          <p:nvPr>
+            <p:ph type="title"/>
+          </p:nvPr>
+        </p:nvSpPr>
+        <p:spPr/>
+        <p:txBody>
+          <a:bodyPr/>
+          <a:lstStyle/>
+          <a:p>
+            <a:r>
+              <a:rPr lang="en-US" dirty="0"/>
+              <a:t>Git checkout</a:t>
+            </a:r>
+          </a:p>
+        </p:txBody>
+      </p:sp>
+      <p:sp>
+        <p:nvSpPr>
+          <p:cNvPr id="3" name="Content Placeholder 2">
+            <a:extLst>
+              <a:ext uri="{FF2B5EF4-FFF2-40B4-BE49-F238E27FC236}">
+                <a16:creationId xmlns:a16="http://schemas.microsoft.com/office/drawing/2014/main" id="{8A5C2614-2A3D-40A4-A630-19D6FB5398C6}"/>
+              </a:ext>
+            </a:extLst>
+          </p:cNvPr>
+          <p:cNvSpPr>
+            <a:spLocks noGrp="1"/>
+          </p:cNvSpPr>
+          <p:nvPr>
+            <p:ph idx="1"/>
+          </p:nvPr>
+        </p:nvSpPr>
+        <p:spPr/>
+        <p:txBody>
+          <a:bodyPr/>
+          <a:lstStyle/>
+          <a:p>
+            <a:r>
+              <a:rPr lang="en-IN" dirty="0"/>
+              <a:t>This command is used to generally to switch from one branch to another.</a:t>
+            </a:r>
+          </a:p>
+          <a:p>
+            <a:r>
+              <a:rPr lang="en-IN" dirty="0"/>
+              <a:t>For example, consider that we are initially on the branch 'master'. Now we create a branch named 'test'. In order to work on the branch , we have to switch branches. This is accomplished by the command 'git checkout test'.</a:t>
+            </a:r>
+            <a:endParaRPr lang="en-US" dirty="0"/>
+          </a:p>
+          <a:p>
+            <a:r>
+              <a:rPr lang="en-IN" dirty="0"/>
+              <a:t>Another use of the git checkout is to undo changes made to files and revert them back to the state they were during the last commit.</a:t>
+            </a:r>
+          </a:p>
+          <a:p>
+            <a:r>
+              <a:rPr lang="en-IN" dirty="0"/>
+              <a:t>For example, if we have a file named target, and we want to revert this file back to the way it was during the previous commit we use the statement 'git checkout -- target'. This will undo all the changes made to the file target since the last commit.</a:t>
+            </a:r>
+            <a:endParaRPr lang="en-US" dirty="0"/>
+          </a:p>
+          <a:p>
+            <a:endParaRPr lang="en-US" dirty="0"/>
+          </a:p>
+        </p:txBody>
+      </p:sp>
+    </p:spTree>
+    <p:extLst>
+      <p:ext uri="{BB962C8B-B14F-4D97-AF65-F5344CB8AC3E}">
+        <p14:creationId xmlns:p14="http://schemas.microsoft.com/office/powerpoint/2010/main" val="638209337"/>
+      </p:ext>
+    </p:extLst>
+  </p:cSld>
+  <p:clrMapOvr>
+    <a:masterClrMapping/>
+  </p:clrMapOvr>
+</p:sld>
+</file>
+
+<file path=ppt/slides/slide21.xml><?xml version="1.0" encoding="utf-8"?>
+<p:sld xmlns:a="http://schemas.openxmlformats.org/drawingml/2006/main" xmlns:r="http://schemas.openxmlformats.org/officeDocument/2006/relationships" xmlns:p="http://schemas.openxmlformats.org/presentationml/2006/main">
+  <p:cSld>
+    <p:spTree>
+      <p:nvGrpSpPr>
+        <p:cNvPr id="1" name=""/>
+        <p:cNvGrpSpPr/>
+        <p:nvPr/>
+      </p:nvGrpSpPr>
+      <p:grpSpPr>
+        <a:xfrm>
+          <a:off x="0" y="0"/>
+          <a:ext cx="0" cy="0"/>
+          <a:chOff x="0" y="0"/>
+          <a:chExt cx="0" cy="0"/>
+        </a:xfrm>
+      </p:grpSpPr>
+      <p:sp>
+        <p:nvSpPr>
+          <p:cNvPr id="2" name="Title 1">
+            <a:extLst>
+              <a:ext uri="{FF2B5EF4-FFF2-40B4-BE49-F238E27FC236}">
+                <a16:creationId xmlns:a16="http://schemas.microsoft.com/office/drawing/2014/main" id="{A5991212-3D46-4D01-889A-4C161FC0A562}"/>
+              </a:ext>
+            </a:extLst>
+          </p:cNvPr>
+          <p:cNvSpPr>
+            <a:spLocks noGrp="1"/>
+          </p:cNvSpPr>
+          <p:nvPr>
+            <p:ph type="title"/>
+          </p:nvPr>
+        </p:nvSpPr>
+        <p:spPr/>
+        <p:txBody>
+          <a:bodyPr/>
+          <a:lstStyle/>
+          <a:p>
+            <a:r>
+              <a:rPr lang="en-US" dirty="0"/>
+              <a:t>Git merge</a:t>
+            </a:r>
+          </a:p>
+        </p:txBody>
+      </p:sp>
+      <p:sp>
+        <p:nvSpPr>
+          <p:cNvPr id="3" name="Content Placeholder 2">
+            <a:extLst>
+              <a:ext uri="{FF2B5EF4-FFF2-40B4-BE49-F238E27FC236}">
+                <a16:creationId xmlns:a16="http://schemas.microsoft.com/office/drawing/2014/main" id="{2968AC03-702C-4045-8A3E-2122E5BFB9DA}"/>
+              </a:ext>
+            </a:extLst>
+          </p:cNvPr>
+          <p:cNvSpPr>
+            <a:spLocks noGrp="1"/>
+          </p:cNvSpPr>
+          <p:nvPr>
+            <p:ph idx="1"/>
+          </p:nvPr>
+        </p:nvSpPr>
+        <p:spPr/>
+        <p:txBody>
+          <a:bodyPr/>
+          <a:lstStyle/>
+          <a:p>
+            <a:r>
+              <a:rPr lang="en-IN" dirty="0"/>
+              <a:t>Once we have finished working on a feature which is on a separate branch, we would like to add this feature to our main branch.</a:t>
+            </a:r>
+          </a:p>
+          <a:p>
+            <a:r>
+              <a:rPr lang="en-IN" dirty="0"/>
+              <a:t>To do this, we must merge out feature branch with our main branch. </a:t>
+            </a:r>
+          </a:p>
+          <a:p>
+            <a:r>
+              <a:rPr lang="en-IN" dirty="0"/>
+              <a:t>To do this, we use the 'git merge &lt;</a:t>
+            </a:r>
+            <a:r>
+              <a:rPr lang="en-IN" dirty="0" err="1"/>
+              <a:t>branch_name</a:t>
+            </a:r>
+            <a:r>
+              <a:rPr lang="en-IN" dirty="0"/>
+              <a:t>&gt;' command. </a:t>
+            </a:r>
+          </a:p>
+          <a:p>
+            <a:r>
+              <a:rPr lang="en-IN" dirty="0"/>
+              <a:t>This command will merge the branch specified by branch name with the branch you are currently on.</a:t>
+            </a:r>
+            <a:endParaRPr lang="en-US" dirty="0"/>
+          </a:p>
+          <a:p>
+            <a:endParaRPr lang="en-US" dirty="0"/>
+          </a:p>
+        </p:txBody>
+      </p:sp>
+    </p:spTree>
+    <p:extLst>
+      <p:ext uri="{BB962C8B-B14F-4D97-AF65-F5344CB8AC3E}">
+        <p14:creationId xmlns:p14="http://schemas.microsoft.com/office/powerpoint/2010/main" val="1970943583"/>
       </p:ext>
     </p:extLst>
   </p:cSld>

</xml_diff>